<commit_message>
PPT 5 slides complete
</commit_message>
<xml_diff>
--- a/5PY_ppt.pptx
+++ b/5PY_ppt.pptx
@@ -7,8 +7,9 @@
   <p:sldIdLst>
     <p:sldId id="259" r:id="rId2"/>
     <p:sldId id="257" r:id="rId3"/>
-    <p:sldId id="258" r:id="rId4"/>
-    <p:sldId id="260" r:id="rId5"/>
+    <p:sldId id="261" r:id="rId4"/>
+    <p:sldId id="258" r:id="rId5"/>
+    <p:sldId id="260" r:id="rId6"/>
   </p:sldIdLst>
   <p:sldSz cx="12192000" cy="6858000"/>
   <p:notesSz cx="6858000" cy="9144000"/>
@@ -262,7 +263,7 @@
           <a:p>
             <a:fld id="{EED1C14C-A143-42F5-B247-D0E800131009}" type="datetimeFigureOut">
               <a:rPr lang="en-US" smtClean="0"/>
-              <a:t>8/11/2023</a:t>
+              <a:t>8/12/2023</a:t>
             </a:fld>
             <a:endParaRPr lang="en-US"/>
           </a:p>
@@ -460,7 +461,7 @@
           <a:p>
             <a:fld id="{EED1C14C-A143-42F5-B247-D0E800131009}" type="datetimeFigureOut">
               <a:rPr lang="en-US" smtClean="0"/>
-              <a:t>8/11/2023</a:t>
+              <a:t>8/12/2023</a:t>
             </a:fld>
             <a:endParaRPr lang="en-US"/>
           </a:p>
@@ -668,7 +669,7 @@
           <a:p>
             <a:fld id="{EED1C14C-A143-42F5-B247-D0E800131009}" type="datetimeFigureOut">
               <a:rPr lang="en-US" smtClean="0"/>
-              <a:t>8/11/2023</a:t>
+              <a:t>8/12/2023</a:t>
             </a:fld>
             <a:endParaRPr lang="en-US"/>
           </a:p>
@@ -866,7 +867,7 @@
           <a:p>
             <a:fld id="{EED1C14C-A143-42F5-B247-D0E800131009}" type="datetimeFigureOut">
               <a:rPr lang="en-US" smtClean="0"/>
-              <a:t>8/11/2023</a:t>
+              <a:t>8/12/2023</a:t>
             </a:fld>
             <a:endParaRPr lang="en-US"/>
           </a:p>
@@ -1141,7 +1142,7 @@
           <a:p>
             <a:fld id="{EED1C14C-A143-42F5-B247-D0E800131009}" type="datetimeFigureOut">
               <a:rPr lang="en-US" smtClean="0"/>
-              <a:t>8/11/2023</a:t>
+              <a:t>8/12/2023</a:t>
             </a:fld>
             <a:endParaRPr lang="en-US"/>
           </a:p>
@@ -1406,7 +1407,7 @@
           <a:p>
             <a:fld id="{EED1C14C-A143-42F5-B247-D0E800131009}" type="datetimeFigureOut">
               <a:rPr lang="en-US" smtClean="0"/>
-              <a:t>8/11/2023</a:t>
+              <a:t>8/12/2023</a:t>
             </a:fld>
             <a:endParaRPr lang="en-US"/>
           </a:p>
@@ -1818,7 +1819,7 @@
           <a:p>
             <a:fld id="{EED1C14C-A143-42F5-B247-D0E800131009}" type="datetimeFigureOut">
               <a:rPr lang="en-US" smtClean="0"/>
-              <a:t>8/11/2023</a:t>
+              <a:t>8/12/2023</a:t>
             </a:fld>
             <a:endParaRPr lang="en-US"/>
           </a:p>
@@ -1959,7 +1960,7 @@
           <a:p>
             <a:fld id="{EED1C14C-A143-42F5-B247-D0E800131009}" type="datetimeFigureOut">
               <a:rPr lang="en-US" smtClean="0"/>
-              <a:t>8/11/2023</a:t>
+              <a:t>8/12/2023</a:t>
             </a:fld>
             <a:endParaRPr lang="en-US"/>
           </a:p>
@@ -2072,7 +2073,7 @@
           <a:p>
             <a:fld id="{EED1C14C-A143-42F5-B247-D0E800131009}" type="datetimeFigureOut">
               <a:rPr lang="en-US" smtClean="0"/>
-              <a:t>8/11/2023</a:t>
+              <a:t>8/12/2023</a:t>
             </a:fld>
             <a:endParaRPr lang="en-US"/>
           </a:p>
@@ -2383,7 +2384,7 @@
           <a:p>
             <a:fld id="{EED1C14C-A143-42F5-B247-D0E800131009}" type="datetimeFigureOut">
               <a:rPr lang="en-US" smtClean="0"/>
-              <a:t>8/11/2023</a:t>
+              <a:t>8/12/2023</a:t>
             </a:fld>
             <a:endParaRPr lang="en-US"/>
           </a:p>
@@ -2671,7 +2672,7 @@
           <a:p>
             <a:fld id="{EED1C14C-A143-42F5-B247-D0E800131009}" type="datetimeFigureOut">
               <a:rPr lang="en-US" smtClean="0"/>
-              <a:t>8/11/2023</a:t>
+              <a:t>8/12/2023</a:t>
             </a:fld>
             <a:endParaRPr lang="en-US"/>
           </a:p>
@@ -2912,7 +2913,7 @@
           <a:p>
             <a:fld id="{EED1C14C-A143-42F5-B247-D0E800131009}" type="datetimeFigureOut">
               <a:rPr lang="en-US" smtClean="0"/>
-              <a:t>8/11/2023</a:t>
+              <a:t>8/12/2023</a:t>
             </a:fld>
             <a:endParaRPr lang="en-US"/>
           </a:p>
@@ -3593,6 +3594,72 @@
 <file path=ppt/slides/slide3.xml><?xml version="1.0" encoding="utf-8"?>
 <p:sld xmlns:a="http://schemas.openxmlformats.org/drawingml/2006/main" xmlns:r="http://schemas.openxmlformats.org/officeDocument/2006/relationships" xmlns:p="http://schemas.openxmlformats.org/presentationml/2006/main">
   <p:cSld>
+    <p:spTree>
+      <p:nvGrpSpPr>
+        <p:cNvPr id="1" name=""/>
+        <p:cNvGrpSpPr/>
+        <p:nvPr/>
+      </p:nvGrpSpPr>
+      <p:grpSpPr>
+        <a:xfrm>
+          <a:off x="0" y="0"/>
+          <a:ext cx="0" cy="0"/>
+          <a:chOff x="0" y="0"/>
+          <a:chExt cx="0" cy="0"/>
+        </a:xfrm>
+      </p:grpSpPr>
+      <p:pic>
+        <p:nvPicPr>
+          <p:cNvPr id="2" name="slide2" descr="Libraries">
+            <a:extLst>
+              <a:ext uri="{FF2B5EF4-FFF2-40B4-BE49-F238E27FC236}">
+                <a16:creationId xmlns:a16="http://schemas.microsoft.com/office/drawing/2014/main" id="{4817A6CC-D47A-4B22-8EC1-FEE78C458BCB}"/>
+              </a:ext>
+            </a:extLst>
+          </p:cNvPr>
+          <p:cNvPicPr>
+            <a:picLocks noChangeAspect="1"/>
+          </p:cNvPicPr>
+          <p:nvPr/>
+        </p:nvPicPr>
+        <p:blipFill>
+          <a:blip r:embed="rId2">
+            <a:extLst>
+              <a:ext uri="{28A0092B-C50C-407E-A947-70E740481C1C}">
+                <a14:useLocalDpi xmlns:a14="http://schemas.microsoft.com/office/drawing/2010/main" val="0"/>
+              </a:ext>
+            </a:extLst>
+          </a:blip>
+          <a:stretch>
+            <a:fillRect/>
+          </a:stretch>
+        </p:blipFill>
+        <p:spPr>
+          <a:xfrm>
+            <a:off x="0" y="1389"/>
+            <a:ext cx="12192001" cy="6855220"/>
+          </a:xfrm>
+          <a:prstGeom prst="rect">
+            <a:avLst/>
+          </a:prstGeom>
+        </p:spPr>
+      </p:pic>
+    </p:spTree>
+    <p:extLst>
+      <p:ext uri="{BB962C8B-B14F-4D97-AF65-F5344CB8AC3E}">
+        <p14:creationId xmlns:p14="http://schemas.microsoft.com/office/powerpoint/2010/main" val="2071479584"/>
+      </p:ext>
+    </p:extLst>
+  </p:cSld>
+  <p:clrMapOvr>
+    <a:masterClrMapping/>
+  </p:clrMapOvr>
+</p:sld>
+</file>
+
+<file path=ppt/slides/slide4.xml><?xml version="1.0" encoding="utf-8"?>
+<p:sld xmlns:a="http://schemas.openxmlformats.org/drawingml/2006/main" xmlns:r="http://schemas.openxmlformats.org/officeDocument/2006/relationships" xmlns:p="http://schemas.openxmlformats.org/presentationml/2006/main">
+  <p:cSld>
     <p:bg>
       <p:bgPr>
         <a:solidFill>
@@ -3617,10 +3684,10 @@
       </p:grpSpPr>
       <p:pic>
         <p:nvPicPr>
-          <p:cNvPr id="7" name="Picture 6">
-            <a:extLst>
-              <a:ext uri="{FF2B5EF4-FFF2-40B4-BE49-F238E27FC236}">
-                <a16:creationId xmlns:a16="http://schemas.microsoft.com/office/drawing/2014/main" id="{BB16F34F-E9BC-4F68-4FAD-8082ECB8F486}"/>
+          <p:cNvPr id="11" name="Picture 10">
+            <a:extLst>
+              <a:ext uri="{FF2B5EF4-FFF2-40B4-BE49-F238E27FC236}">
+                <a16:creationId xmlns:a16="http://schemas.microsoft.com/office/drawing/2014/main" id="{8BA0DF5F-40DF-A7DE-350E-706506D4789E}"/>
               </a:ext>
             </a:extLst>
           </p:cNvPr>
@@ -3631,6 +3698,66 @@
         </p:nvPicPr>
         <p:blipFill>
           <a:blip r:embed="rId2"/>
+          <a:stretch>
+            <a:fillRect/>
+          </a:stretch>
+        </p:blipFill>
+        <p:spPr>
+          <a:xfrm>
+            <a:off x="4239857" y="3838574"/>
+            <a:ext cx="3837343" cy="3067051"/>
+          </a:xfrm>
+          <a:prstGeom prst="rect">
+            <a:avLst/>
+          </a:prstGeom>
+        </p:spPr>
+      </p:pic>
+      <p:pic>
+        <p:nvPicPr>
+          <p:cNvPr id="3" name="Picture 2">
+            <a:extLst>
+              <a:ext uri="{FF2B5EF4-FFF2-40B4-BE49-F238E27FC236}">
+                <a16:creationId xmlns:a16="http://schemas.microsoft.com/office/drawing/2014/main" id="{53DEF510-8064-521F-19A0-D685CBDFB9FD}"/>
+              </a:ext>
+            </a:extLst>
+          </p:cNvPr>
+          <p:cNvPicPr>
+            <a:picLocks noChangeAspect="1"/>
+          </p:cNvPicPr>
+          <p:nvPr/>
+        </p:nvPicPr>
+        <p:blipFill>
+          <a:blip r:embed="rId3"/>
+          <a:stretch>
+            <a:fillRect/>
+          </a:stretch>
+        </p:blipFill>
+        <p:spPr>
+          <a:xfrm>
+            <a:off x="7419975" y="4205288"/>
+            <a:ext cx="4819650" cy="2700337"/>
+          </a:xfrm>
+          <a:prstGeom prst="rect">
+            <a:avLst/>
+          </a:prstGeom>
+        </p:spPr>
+      </p:pic>
+      <p:pic>
+        <p:nvPicPr>
+          <p:cNvPr id="7" name="Picture 6">
+            <a:extLst>
+              <a:ext uri="{FF2B5EF4-FFF2-40B4-BE49-F238E27FC236}">
+                <a16:creationId xmlns:a16="http://schemas.microsoft.com/office/drawing/2014/main" id="{BB16F34F-E9BC-4F68-4FAD-8082ECB8F486}"/>
+              </a:ext>
+            </a:extLst>
+          </p:cNvPr>
+          <p:cNvPicPr>
+            <a:picLocks noChangeAspect="1"/>
+          </p:cNvPicPr>
+          <p:nvPr/>
+        </p:nvPicPr>
+        <p:blipFill>
+          <a:blip r:embed="rId4"/>
           <a:stretch>
             <a:fillRect/>
           </a:stretch>
@@ -3660,15 +3787,15 @@
           <p:nvPr/>
         </p:nvPicPr>
         <p:blipFill>
-          <a:blip r:embed="rId3"/>
+          <a:blip r:embed="rId5"/>
           <a:stretch>
             <a:fillRect/>
           </a:stretch>
         </p:blipFill>
         <p:spPr>
           <a:xfrm>
-            <a:off x="38099" y="3471863"/>
-            <a:ext cx="5563833" cy="3386137"/>
+            <a:off x="38100" y="3471863"/>
+            <a:ext cx="4391026" cy="3386137"/>
           </a:xfrm>
           <a:prstGeom prst="rect">
             <a:avLst/>
@@ -3692,7 +3819,7 @@
           </p:nvPr>
         </p:nvPicPr>
         <p:blipFill>
-          <a:blip r:embed="rId4">
+          <a:blip r:embed="rId6">
             <a:extLst>
               <a:ext uri="{28A0092B-C50C-407E-A947-70E740481C1C}">
                 <a14:useLocalDpi xmlns:a14="http://schemas.microsoft.com/office/drawing/2010/main" val="0"/>
@@ -3712,10 +3839,10 @@
       </p:pic>
       <p:pic>
         <p:nvPicPr>
-          <p:cNvPr id="11" name="Picture 10">
-            <a:extLst>
-              <a:ext uri="{FF2B5EF4-FFF2-40B4-BE49-F238E27FC236}">
-                <a16:creationId xmlns:a16="http://schemas.microsoft.com/office/drawing/2014/main" id="{8BA0DF5F-40DF-A7DE-350E-706506D4789E}"/>
+          <p:cNvPr id="13" name="Picture 12">
+            <a:extLst>
+              <a:ext uri="{FF2B5EF4-FFF2-40B4-BE49-F238E27FC236}">
+                <a16:creationId xmlns:a16="http://schemas.microsoft.com/office/drawing/2014/main" id="{43D85EE3-8279-4217-DA05-C39C5C011F46}"/>
               </a:ext>
             </a:extLst>
           </p:cNvPr>
@@ -3725,44 +3852,14 @@
           <p:nvPr/>
         </p:nvPicPr>
         <p:blipFill>
-          <a:blip r:embed="rId5"/>
+          <a:blip r:embed="rId7"/>
           <a:stretch>
             <a:fillRect/>
           </a:stretch>
         </p:blipFill>
         <p:spPr>
           <a:xfrm>
-            <a:off x="5705474" y="3743324"/>
-            <a:ext cx="5326811" cy="3067051"/>
-          </a:xfrm>
-          <a:prstGeom prst="rect">
-            <a:avLst/>
-          </a:prstGeom>
-        </p:spPr>
-      </p:pic>
-      <p:pic>
-        <p:nvPicPr>
-          <p:cNvPr id="13" name="Picture 12">
-            <a:extLst>
-              <a:ext uri="{FF2B5EF4-FFF2-40B4-BE49-F238E27FC236}">
-                <a16:creationId xmlns:a16="http://schemas.microsoft.com/office/drawing/2014/main" id="{43D85EE3-8279-4217-DA05-C39C5C011F46}"/>
-              </a:ext>
-            </a:extLst>
-          </p:cNvPr>
-          <p:cNvPicPr>
-            <a:picLocks noChangeAspect="1"/>
-          </p:cNvPicPr>
-          <p:nvPr/>
-        </p:nvPicPr>
-        <p:blipFill>
-          <a:blip r:embed="rId6"/>
-          <a:stretch>
-            <a:fillRect/>
-          </a:stretch>
-        </p:blipFill>
-        <p:spPr>
-          <a:xfrm>
-            <a:off x="9860710" y="5619750"/>
+            <a:off x="4533900" y="5667375"/>
             <a:ext cx="2343150" cy="1190625"/>
           </a:xfrm>
           <a:prstGeom prst="rect">
@@ -3785,7 +3882,7 @@
         <p:spPr>
           <a:xfrm>
             <a:off x="2466975" y="2981325"/>
-            <a:ext cx="7296150" cy="1352550"/>
+            <a:ext cx="7696200" cy="1352550"/>
           </a:xfrm>
           <a:prstGeom prst="rect">
             <a:avLst/>
@@ -3828,7 +3925,7 @@
                 <a:ea typeface="+mj-ea"/>
                 <a:cs typeface="+mj-cs"/>
               </a:rPr>
-              <a:t>TIMELAPSE GIFS, NETWORK CHARTS, RADAR PLOTS, WAFFLE CHARTS AND MUCH MORE WITH MATPLOTLIB</a:t>
+              <a:t>TIMELAPSE GIFS, NETWORK CHARTS, RADAR PLOTS, WAFFLE CHARTS,SANKEYS AND MUCH MORE WITH MATPLOTLIB</a:t>
             </a:r>
           </a:p>
         </p:txBody>
@@ -3846,7 +3943,7 @@
 </p:sld>
 </file>
 
-<file path=ppt/slides/slide4.xml><?xml version="1.0" encoding="utf-8"?>
+<file path=ppt/slides/slide5.xml><?xml version="1.0" encoding="utf-8"?>
 <p:sld xmlns:a="http://schemas.openxmlformats.org/drawingml/2006/main" xmlns:r="http://schemas.openxmlformats.org/officeDocument/2006/relationships" xmlns:p="http://schemas.openxmlformats.org/presentationml/2006/main">
   <p:cSld>
     <p:spTree>

</xml_diff>

<commit_message>
Added Comments and modified PPT
</commit_message>
<xml_diff>
--- a/5PY_ppt.pptx
+++ b/5PY_ppt.pptx
@@ -7,9 +7,10 @@
   <p:sldIdLst>
     <p:sldId id="259" r:id="rId2"/>
     <p:sldId id="257" r:id="rId3"/>
-    <p:sldId id="261" r:id="rId4"/>
+    <p:sldId id="263" r:id="rId4"/>
     <p:sldId id="258" r:id="rId5"/>
-    <p:sldId id="260" r:id="rId6"/>
+    <p:sldId id="262" r:id="rId6"/>
+    <p:sldId id="260" r:id="rId7"/>
   </p:sldIdLst>
   <p:sldSz cx="12192000" cy="6858000"/>
   <p:notesSz cx="6858000" cy="9144000"/>
@@ -263,7 +264,7 @@
           <a:p>
             <a:fld id="{EED1C14C-A143-42F5-B247-D0E800131009}" type="datetimeFigureOut">
               <a:rPr lang="en-US" smtClean="0"/>
-              <a:t>8/12/2023</a:t>
+              <a:t>8/13/2023</a:t>
             </a:fld>
             <a:endParaRPr lang="en-US"/>
           </a:p>
@@ -461,7 +462,7 @@
           <a:p>
             <a:fld id="{EED1C14C-A143-42F5-B247-D0E800131009}" type="datetimeFigureOut">
               <a:rPr lang="en-US" smtClean="0"/>
-              <a:t>8/12/2023</a:t>
+              <a:t>8/13/2023</a:t>
             </a:fld>
             <a:endParaRPr lang="en-US"/>
           </a:p>
@@ -669,7 +670,7 @@
           <a:p>
             <a:fld id="{EED1C14C-A143-42F5-B247-D0E800131009}" type="datetimeFigureOut">
               <a:rPr lang="en-US" smtClean="0"/>
-              <a:t>8/12/2023</a:t>
+              <a:t>8/13/2023</a:t>
             </a:fld>
             <a:endParaRPr lang="en-US"/>
           </a:p>
@@ -867,7 +868,7 @@
           <a:p>
             <a:fld id="{EED1C14C-A143-42F5-B247-D0E800131009}" type="datetimeFigureOut">
               <a:rPr lang="en-US" smtClean="0"/>
-              <a:t>8/12/2023</a:t>
+              <a:t>8/13/2023</a:t>
             </a:fld>
             <a:endParaRPr lang="en-US"/>
           </a:p>
@@ -1142,7 +1143,7 @@
           <a:p>
             <a:fld id="{EED1C14C-A143-42F5-B247-D0E800131009}" type="datetimeFigureOut">
               <a:rPr lang="en-US" smtClean="0"/>
-              <a:t>8/12/2023</a:t>
+              <a:t>8/13/2023</a:t>
             </a:fld>
             <a:endParaRPr lang="en-US"/>
           </a:p>
@@ -1407,7 +1408,7 @@
           <a:p>
             <a:fld id="{EED1C14C-A143-42F5-B247-D0E800131009}" type="datetimeFigureOut">
               <a:rPr lang="en-US" smtClean="0"/>
-              <a:t>8/12/2023</a:t>
+              <a:t>8/13/2023</a:t>
             </a:fld>
             <a:endParaRPr lang="en-US"/>
           </a:p>
@@ -1819,7 +1820,7 @@
           <a:p>
             <a:fld id="{EED1C14C-A143-42F5-B247-D0E800131009}" type="datetimeFigureOut">
               <a:rPr lang="en-US" smtClean="0"/>
-              <a:t>8/12/2023</a:t>
+              <a:t>8/13/2023</a:t>
             </a:fld>
             <a:endParaRPr lang="en-US"/>
           </a:p>
@@ -1960,7 +1961,7 @@
           <a:p>
             <a:fld id="{EED1C14C-A143-42F5-B247-D0E800131009}" type="datetimeFigureOut">
               <a:rPr lang="en-US" smtClean="0"/>
-              <a:t>8/12/2023</a:t>
+              <a:t>8/13/2023</a:t>
             </a:fld>
             <a:endParaRPr lang="en-US"/>
           </a:p>
@@ -2073,7 +2074,7 @@
           <a:p>
             <a:fld id="{EED1C14C-A143-42F5-B247-D0E800131009}" type="datetimeFigureOut">
               <a:rPr lang="en-US" smtClean="0"/>
-              <a:t>8/12/2023</a:t>
+              <a:t>8/13/2023</a:t>
             </a:fld>
             <a:endParaRPr lang="en-US"/>
           </a:p>
@@ -2384,7 +2385,7 @@
           <a:p>
             <a:fld id="{EED1C14C-A143-42F5-B247-D0E800131009}" type="datetimeFigureOut">
               <a:rPr lang="en-US" smtClean="0"/>
-              <a:t>8/12/2023</a:t>
+              <a:t>8/13/2023</a:t>
             </a:fld>
             <a:endParaRPr lang="en-US"/>
           </a:p>
@@ -2672,7 +2673,7 @@
           <a:p>
             <a:fld id="{EED1C14C-A143-42F5-B247-D0E800131009}" type="datetimeFigureOut">
               <a:rPr lang="en-US" smtClean="0"/>
-              <a:t>8/12/2023</a:t>
+              <a:t>8/13/2023</a:t>
             </a:fld>
             <a:endParaRPr lang="en-US"/>
           </a:p>
@@ -2913,7 +2914,7 @@
           <a:p>
             <a:fld id="{EED1C14C-A143-42F5-B247-D0E800131009}" type="datetimeFigureOut">
               <a:rPr lang="en-US" smtClean="0"/>
-              <a:t>8/12/2023</a:t>
+              <a:t>8/13/2023</a:t>
             </a:fld>
             <a:endParaRPr lang="en-US"/>
           </a:p>
@@ -3547,7 +3548,7 @@
           <p:cNvPr id="2" name="slide2" descr="Overview">
             <a:extLst>
               <a:ext uri="{FF2B5EF4-FFF2-40B4-BE49-F238E27FC236}">
-                <a16:creationId xmlns:a16="http://schemas.microsoft.com/office/drawing/2014/main" id="{F32AAD41-2FDB-468B-8338-4CA66E0C2439}"/>
+                <a16:creationId xmlns:a16="http://schemas.microsoft.com/office/drawing/2014/main" id="{F3F67449-629A-4D29-999D-99903E230CDD}"/>
               </a:ext>
             </a:extLst>
           </p:cNvPr>
@@ -3613,7 +3614,7 @@
           <p:cNvPr id="2" name="slide2" descr="Libraries">
             <a:extLst>
               <a:ext uri="{FF2B5EF4-FFF2-40B4-BE49-F238E27FC236}">
-                <a16:creationId xmlns:a16="http://schemas.microsoft.com/office/drawing/2014/main" id="{4817A6CC-D47A-4B22-8EC1-FEE78C458BCB}"/>
+                <a16:creationId xmlns:a16="http://schemas.microsoft.com/office/drawing/2014/main" id="{1CAA5952-F641-4308-8D8F-4F1A5FE73648}"/>
               </a:ext>
             </a:extLst>
           </p:cNvPr>
@@ -3647,7 +3648,7 @@
     </p:spTree>
     <p:extLst>
       <p:ext uri="{BB962C8B-B14F-4D97-AF65-F5344CB8AC3E}">
-        <p14:creationId xmlns:p14="http://schemas.microsoft.com/office/powerpoint/2010/main" val="2071479584"/>
+        <p14:creationId xmlns:p14="http://schemas.microsoft.com/office/powerpoint/2010/main" val="667463541"/>
       </p:ext>
     </p:extLst>
   </p:cSld>
@@ -3955,7 +3956,7 @@
                 <a:ea typeface="+mj-ea"/>
                 <a:cs typeface="+mj-cs"/>
               </a:rPr>
-              <a:t>TIMELAPSE GIFS, NETWORK CHARTS, RADAR PLOTS, WAFFLE CHARTS,SANKEYS, CHORD DIAGRAMS AND MUCH MORE WITH MATPLOTLIB &amp; SEABORN</a:t>
+              <a:t>TIMELAPSE GIFS, NETWORK CHARTS, RADAR PLOTS, WAFFLE CHARTS,SANKEYS, CHORD DIAGRAMS…</a:t>
             </a:r>
           </a:p>
         </p:txBody>
@@ -3974,6 +3975,257 @@
 </file>
 
 <file path=ppt/slides/slide5.xml><?xml version="1.0" encoding="utf-8"?>
+<p:sld xmlns:a="http://schemas.openxmlformats.org/drawingml/2006/main" xmlns:r="http://schemas.openxmlformats.org/officeDocument/2006/relationships" xmlns:p="http://schemas.openxmlformats.org/presentationml/2006/main">
+  <p:cSld>
+    <p:bg>
+      <p:bgPr>
+        <a:solidFill>
+          <a:schemeClr val="tx1"/>
+        </a:solidFill>
+        <a:effectLst/>
+      </p:bgPr>
+    </p:bg>
+    <p:spTree>
+      <p:nvGrpSpPr>
+        <p:cNvPr id="1" name=""/>
+        <p:cNvGrpSpPr/>
+        <p:nvPr/>
+      </p:nvGrpSpPr>
+      <p:grpSpPr>
+        <a:xfrm>
+          <a:off x="0" y="0"/>
+          <a:ext cx="0" cy="0"/>
+          <a:chOff x="0" y="0"/>
+          <a:chExt cx="0" cy="0"/>
+        </a:xfrm>
+      </p:grpSpPr>
+      <p:pic>
+        <p:nvPicPr>
+          <p:cNvPr id="5" name="Picture 4">
+            <a:extLst>
+              <a:ext uri="{FF2B5EF4-FFF2-40B4-BE49-F238E27FC236}">
+                <a16:creationId xmlns:a16="http://schemas.microsoft.com/office/drawing/2014/main" id="{C2813477-F5DF-87DA-BEED-910FBC03287D}"/>
+              </a:ext>
+            </a:extLst>
+          </p:cNvPr>
+          <p:cNvPicPr>
+            <a:picLocks noChangeAspect="1"/>
+          </p:cNvPicPr>
+          <p:nvPr/>
+        </p:nvPicPr>
+        <p:blipFill>
+          <a:blip r:embed="rId2"/>
+          <a:stretch>
+            <a:fillRect/>
+          </a:stretch>
+        </p:blipFill>
+        <p:spPr>
+          <a:xfrm>
+            <a:off x="0" y="0"/>
+            <a:ext cx="3802485" cy="3660457"/>
+          </a:xfrm>
+          <a:prstGeom prst="rect">
+            <a:avLst/>
+          </a:prstGeom>
+        </p:spPr>
+      </p:pic>
+      <p:pic>
+        <p:nvPicPr>
+          <p:cNvPr id="7" name="Picture 6">
+            <a:extLst>
+              <a:ext uri="{FF2B5EF4-FFF2-40B4-BE49-F238E27FC236}">
+                <a16:creationId xmlns:a16="http://schemas.microsoft.com/office/drawing/2014/main" id="{AC98D320-B5A9-4818-23FE-60536C3294AF}"/>
+              </a:ext>
+            </a:extLst>
+          </p:cNvPr>
+          <p:cNvPicPr>
+            <a:picLocks noChangeAspect="1"/>
+          </p:cNvPicPr>
+          <p:nvPr/>
+        </p:nvPicPr>
+        <p:blipFill>
+          <a:blip r:embed="rId3"/>
+          <a:stretch>
+            <a:fillRect/>
+          </a:stretch>
+        </p:blipFill>
+        <p:spPr>
+          <a:xfrm>
+            <a:off x="3832965" y="7018"/>
+            <a:ext cx="3989387" cy="3653439"/>
+          </a:xfrm>
+          <a:prstGeom prst="rect">
+            <a:avLst/>
+          </a:prstGeom>
+        </p:spPr>
+      </p:pic>
+      <p:pic>
+        <p:nvPicPr>
+          <p:cNvPr id="9" name="Picture 8">
+            <a:extLst>
+              <a:ext uri="{FF2B5EF4-FFF2-40B4-BE49-F238E27FC236}">
+                <a16:creationId xmlns:a16="http://schemas.microsoft.com/office/drawing/2014/main" id="{EFC89F37-032C-9D6F-79B0-8FB755CBEDAD}"/>
+              </a:ext>
+            </a:extLst>
+          </p:cNvPr>
+          <p:cNvPicPr>
+            <a:picLocks noChangeAspect="1"/>
+          </p:cNvPicPr>
+          <p:nvPr/>
+        </p:nvPicPr>
+        <p:blipFill>
+          <a:blip r:embed="rId4"/>
+          <a:stretch>
+            <a:fillRect/>
+          </a:stretch>
+        </p:blipFill>
+        <p:spPr>
+          <a:xfrm>
+            <a:off x="7822352" y="7019"/>
+            <a:ext cx="4369648" cy="3660458"/>
+          </a:xfrm>
+          <a:prstGeom prst="rect">
+            <a:avLst/>
+          </a:prstGeom>
+        </p:spPr>
+      </p:pic>
+      <p:pic>
+        <p:nvPicPr>
+          <p:cNvPr id="11" name="Picture 10">
+            <a:extLst>
+              <a:ext uri="{FF2B5EF4-FFF2-40B4-BE49-F238E27FC236}">
+                <a16:creationId xmlns:a16="http://schemas.microsoft.com/office/drawing/2014/main" id="{FFC398AC-0EDB-A7F6-D531-CE77C619B5A3}"/>
+              </a:ext>
+            </a:extLst>
+          </p:cNvPr>
+          <p:cNvPicPr>
+            <a:picLocks noChangeAspect="1"/>
+          </p:cNvPicPr>
+          <p:nvPr/>
+        </p:nvPicPr>
+        <p:blipFill>
+          <a:blip r:embed="rId5"/>
+          <a:stretch>
+            <a:fillRect/>
+          </a:stretch>
+        </p:blipFill>
+        <p:spPr>
+          <a:xfrm>
+            <a:off x="0" y="3660457"/>
+            <a:ext cx="5567679" cy="3204563"/>
+          </a:xfrm>
+          <a:prstGeom prst="rect">
+            <a:avLst/>
+          </a:prstGeom>
+        </p:spPr>
+      </p:pic>
+      <p:pic>
+        <p:nvPicPr>
+          <p:cNvPr id="17" name="Picture 16">
+            <a:extLst>
+              <a:ext uri="{FF2B5EF4-FFF2-40B4-BE49-F238E27FC236}">
+                <a16:creationId xmlns:a16="http://schemas.microsoft.com/office/drawing/2014/main" id="{2BFA1DFB-AA7D-201A-DAC9-9ED9E156D244}"/>
+              </a:ext>
+            </a:extLst>
+          </p:cNvPr>
+          <p:cNvPicPr>
+            <a:picLocks noChangeAspect="1"/>
+          </p:cNvPicPr>
+          <p:nvPr/>
+        </p:nvPicPr>
+        <p:blipFill>
+          <a:blip r:embed="rId6"/>
+          <a:stretch>
+            <a:fillRect/>
+          </a:stretch>
+        </p:blipFill>
+        <p:spPr>
+          <a:xfrm>
+            <a:off x="5567678" y="3505200"/>
+            <a:ext cx="6624321" cy="3352799"/>
+          </a:xfrm>
+          <a:prstGeom prst="rect">
+            <a:avLst/>
+          </a:prstGeom>
+        </p:spPr>
+      </p:pic>
+      <p:sp>
+        <p:nvSpPr>
+          <p:cNvPr id="18" name="Rectangle 17">
+            <a:extLst>
+              <a:ext uri="{FF2B5EF4-FFF2-40B4-BE49-F238E27FC236}">
+                <a16:creationId xmlns:a16="http://schemas.microsoft.com/office/drawing/2014/main" id="{A2C41DA2-9DA5-93C6-97B9-70B2186E195E}"/>
+              </a:ext>
+            </a:extLst>
+          </p:cNvPr>
+          <p:cNvSpPr/>
+          <p:nvPr/>
+        </p:nvSpPr>
+        <p:spPr>
+          <a:xfrm>
+            <a:off x="1423987" y="1991043"/>
+            <a:ext cx="9344025" cy="1600200"/>
+          </a:xfrm>
+          <a:prstGeom prst="rect">
+            <a:avLst/>
+          </a:prstGeom>
+        </p:spPr>
+        <p:style>
+          <a:lnRef idx="2">
+            <a:schemeClr val="dk1">
+              <a:shade val="15000"/>
+            </a:schemeClr>
+          </a:lnRef>
+          <a:fillRef idx="1">
+            <a:schemeClr val="dk1"/>
+          </a:fillRef>
+          <a:effectRef idx="0">
+            <a:schemeClr val="dk1"/>
+          </a:effectRef>
+          <a:fontRef idx="minor">
+            <a:schemeClr val="lt1"/>
+          </a:fontRef>
+        </p:style>
+        <p:txBody>
+          <a:bodyPr rtlCol="0" anchor="ctr"/>
+          <a:lstStyle/>
+          <a:p>
+            <a:pPr algn="ctr">
+              <a:lnSpc>
+                <a:spcPct val="90000"/>
+              </a:lnSpc>
+              <a:spcBef>
+                <a:spcPct val="0"/>
+              </a:spcBef>
+            </a:pPr>
+            <a:r>
+              <a:rPr lang="en-US" sz="2400" dirty="0">
+                <a:solidFill>
+                  <a:schemeClr val="bg1"/>
+                </a:solidFill>
+                <a:latin typeface="Arial Black" panose="020B0A04020102020204" pitchFamily="34" charset="0"/>
+                <a:ea typeface="+mj-ea"/>
+                <a:cs typeface="+mj-cs"/>
+              </a:rPr>
+              <a:t>CLUSTERED HEAT MAPS, CONTOUR MAPS,PARALLEL COORDINATES AND EVEN A MINI-DASHBOARD APP ON HTML. PYTHON REALLY CAN DO ANYTHING</a:t>
+            </a:r>
+          </a:p>
+        </p:txBody>
+      </p:sp>
+    </p:spTree>
+    <p:extLst>
+      <p:ext uri="{BB962C8B-B14F-4D97-AF65-F5344CB8AC3E}">
+        <p14:creationId xmlns:p14="http://schemas.microsoft.com/office/powerpoint/2010/main" val="701252720"/>
+      </p:ext>
+    </p:extLst>
+  </p:cSld>
+  <p:clrMapOvr>
+    <a:masterClrMapping/>
+  </p:clrMapOvr>
+</p:sld>
+</file>
+
+<file path=ppt/slides/slide6.xml><?xml version="1.0" encoding="utf-8"?>
 <p:sld xmlns:a="http://schemas.openxmlformats.org/drawingml/2006/main" xmlns:r="http://schemas.openxmlformats.org/officeDocument/2006/relationships" xmlns:p="http://schemas.openxmlformats.org/presentationml/2006/main">
   <p:cSld>
     <p:spTree>

</xml_diff>

<commit_message>
Final Check and updates
</commit_message>
<xml_diff>
--- a/5PY_ppt.pptx
+++ b/5PY_ppt.pptx
@@ -7,7 +7,7 @@
   <p:sldIdLst>
     <p:sldId id="259" r:id="rId2"/>
     <p:sldId id="257" r:id="rId3"/>
-    <p:sldId id="265" r:id="rId4"/>
+    <p:sldId id="263" r:id="rId4"/>
     <p:sldId id="258" r:id="rId5"/>
     <p:sldId id="262" r:id="rId6"/>
     <p:sldId id="264" r:id="rId7"/>
@@ -3548,7 +3548,7 @@
           <p:cNvPr id="2" name="slide2" descr="Overview">
             <a:extLst>
               <a:ext uri="{FF2B5EF4-FFF2-40B4-BE49-F238E27FC236}">
-                <a16:creationId xmlns:a16="http://schemas.microsoft.com/office/drawing/2014/main" id="{CB68B4AF-D93B-4223-8C3F-4E48203A9BFD}"/>
+                <a16:creationId xmlns:a16="http://schemas.microsoft.com/office/drawing/2014/main" id="{0A91E88D-0D27-4D43-8D5B-7640298BA426}"/>
               </a:ext>
             </a:extLst>
           </p:cNvPr>
@@ -3614,7 +3614,7 @@
           <p:cNvPr id="2" name="slide2" descr="Libraries">
             <a:extLst>
               <a:ext uri="{FF2B5EF4-FFF2-40B4-BE49-F238E27FC236}">
-                <a16:creationId xmlns:a16="http://schemas.microsoft.com/office/drawing/2014/main" id="{6C09DA4C-FFC5-48C1-8BB1-4672D2442868}"/>
+                <a16:creationId xmlns:a16="http://schemas.microsoft.com/office/drawing/2014/main" id="{CB4CFD73-5BE9-4CEE-847F-FC534E2C312F}"/>
               </a:ext>
             </a:extLst>
           </p:cNvPr>
@@ -3648,7 +3648,7 @@
     </p:spTree>
     <p:extLst>
       <p:ext uri="{BB962C8B-B14F-4D97-AF65-F5344CB8AC3E}">
-        <p14:creationId xmlns:p14="http://schemas.microsoft.com/office/powerpoint/2010/main" val="2768121689"/>
+        <p14:creationId xmlns:p14="http://schemas.microsoft.com/office/powerpoint/2010/main" val="3551675486"/>
       </p:ext>
     </p:extLst>
   </p:cSld>
@@ -4247,7 +4247,7 @@
           <p:cNvPr id="2" name="slide2" descr="CoxComb">
             <a:extLst>
               <a:ext uri="{FF2B5EF4-FFF2-40B4-BE49-F238E27FC236}">
-                <a16:creationId xmlns:a16="http://schemas.microsoft.com/office/drawing/2014/main" id="{86FC10C5-7099-4BF6-B9F5-5EF14969F142}"/>
+                <a16:creationId xmlns:a16="http://schemas.microsoft.com/office/drawing/2014/main" id="{54296A0A-C31D-4328-AF57-0AE1FC07E280}"/>
               </a:ext>
             </a:extLst>
           </p:cNvPr>
@@ -4281,7 +4281,7 @@
     </p:spTree>
     <p:extLst>
       <p:ext uri="{BB962C8B-B14F-4D97-AF65-F5344CB8AC3E}">
-        <p14:creationId xmlns:p14="http://schemas.microsoft.com/office/powerpoint/2010/main" val="490771106"/>
+        <p14:creationId xmlns:p14="http://schemas.microsoft.com/office/powerpoint/2010/main" val="4198186520"/>
       </p:ext>
     </p:extLst>
   </p:cSld>

</xml_diff>